<commit_message>
feat: refatorando aula 2
</commit_message>
<xml_diff>
--- a/IoT/Aula 00 - Aula Magna e Orientações/Aula 00 - Aula Magna e Orientações v1.pptx
+++ b/IoT/Aula 00 - Aula Magna e Orientações/Aula 00 - Aula Magna e Orientações v1.pptx
@@ -217,7 +217,7 @@
             <a:fld id="{4EA5E1ED-E65E-440E-8A4B-5F5DC973F797}" type="datetimeFigureOut">
               <a:rPr lang="pt-BR" smtClean="0"/>
               <a:pPr/>
-              <a:t>26/07/2023</a:t>
+              <a:t>06/08/2023</a:t>
             </a:fld>
             <a:endParaRPr lang="pt-BR"/>
           </a:p>
@@ -634,7 +634,7 @@
           <a:p>
             <a:fld id="{1787AD07-0C2A-424C-83EF-FCCF4A0D3BA0}" type="datetime1">
               <a:rPr lang="pt-BR" smtClean="0"/>
-              <a:t>26/07/2023</a:t>
+              <a:t>06/08/2023</a:t>
             </a:fld>
             <a:endParaRPr lang="pt-BR"/>
           </a:p>
@@ -803,7 +803,7 @@
           <a:p>
             <a:fld id="{2F92FB66-59C8-46A5-AD82-5DAAFD2DC390}" type="datetime1">
               <a:rPr lang="pt-BR" smtClean="0"/>
-              <a:t>26/07/2023</a:t>
+              <a:t>06/08/2023</a:t>
             </a:fld>
             <a:endParaRPr lang="pt-BR"/>
           </a:p>
@@ -982,7 +982,7 @@
           <a:p>
             <a:fld id="{3D5CC8D2-C61E-4471-AD68-1C0D45A8EAFC}" type="datetime1">
               <a:rPr lang="pt-BR" smtClean="0"/>
-              <a:t>26/07/2023</a:t>
+              <a:t>06/08/2023</a:t>
             </a:fld>
             <a:endParaRPr lang="pt-BR"/>
           </a:p>
@@ -1125,7 +1125,7 @@
           <a:p>
             <a:fld id="{C3E38981-C08A-4A29-B885-392FB4EE0709}" type="datetime1">
               <a:rPr lang="pt-BR" smtClean="0"/>
-              <a:t>26/07/2023</a:t>
+              <a:t>06/08/2023</a:t>
             </a:fld>
             <a:endParaRPr lang="en-US" dirty="0"/>
           </a:p>
@@ -1510,7 +1510,7 @@
           <a:p>
             <a:fld id="{2CFE63D7-5B4A-40A4-8FD4-EA63D1010EB7}" type="datetime1">
               <a:rPr lang="pt-BR" smtClean="0"/>
-              <a:t>26/07/2023</a:t>
+              <a:t>06/08/2023</a:t>
             </a:fld>
             <a:endParaRPr lang="en-US" dirty="0"/>
           </a:p>
@@ -1732,7 +1732,7 @@
           <a:p>
             <a:fld id="{A9719147-5557-4D76-A2C3-BF25882771D2}" type="datetime1">
               <a:rPr lang="pt-BR" smtClean="0"/>
-              <a:t>26/07/2023</a:t>
+              <a:t>06/08/2023</a:t>
             </a:fld>
             <a:endParaRPr lang="en-US" dirty="0"/>
           </a:p>
@@ -2045,7 +2045,7 @@
           <a:p>
             <a:fld id="{66250340-7104-44A8-88A9-88532CCE9C1C}" type="datetime1">
               <a:rPr lang="pt-BR" smtClean="0"/>
-              <a:t>26/07/2023</a:t>
+              <a:t>06/08/2023</a:t>
             </a:fld>
             <a:endParaRPr lang="en-US" dirty="0"/>
           </a:p>
@@ -2230,7 +2230,7 @@
           <a:p>
             <a:fld id="{D047EA32-7810-48BE-A9BB-EA3D8AA5AD34}" type="datetime1">
               <a:rPr lang="pt-BR" smtClean="0"/>
-              <a:t>26/07/2023</a:t>
+              <a:t>06/08/2023</a:t>
             </a:fld>
             <a:endParaRPr lang="en-US" dirty="0"/>
           </a:p>
@@ -2378,7 +2378,7 @@
           <a:p>
             <a:fld id="{7C28E9E9-B91F-400E-BE43-87BB4B5C6F4E}" type="datetime1">
               <a:rPr lang="pt-BR" smtClean="0"/>
-              <a:t>26/07/2023</a:t>
+              <a:t>06/08/2023</a:t>
             </a:fld>
             <a:endParaRPr lang="en-US" dirty="0"/>
           </a:p>
@@ -2630,7 +2630,7 @@
           <a:p>
             <a:fld id="{A9E773EA-BFD5-41D4-8CCD-2C9F67DAB481}" type="datetime1">
               <a:rPr lang="pt-BR" smtClean="0"/>
-              <a:t>26/07/2023</a:t>
+              <a:t>06/08/2023</a:t>
             </a:fld>
             <a:endParaRPr lang="pt-BR" dirty="0"/>
           </a:p>
@@ -2832,7 +2832,7 @@
           <a:p>
             <a:fld id="{DAA7C8B6-CF57-4A95-AF6C-A77E6C230ED3}" type="datetime1">
               <a:rPr lang="pt-BR" smtClean="0"/>
-              <a:t>26/07/2023</a:t>
+              <a:t>06/08/2023</a:t>
             </a:fld>
             <a:endParaRPr lang="pt-BR"/>
           </a:p>
@@ -3116,7 +3116,7 @@
           <a:p>
             <a:fld id="{34D50989-24C8-4023-9B0D-A6D249548FD9}" type="datetime1">
               <a:rPr lang="pt-BR" smtClean="0"/>
-              <a:t>26/07/2023</a:t>
+              <a:t>06/08/2023</a:t>
             </a:fld>
             <a:endParaRPr lang="pt-BR"/>
           </a:p>
@@ -3352,7 +3352,7 @@
           <a:p>
             <a:fld id="{8D9BC96A-9776-4585-A439-BC9E2DA226C1}" type="datetime1">
               <a:rPr lang="pt-BR" smtClean="0"/>
-              <a:t>26/07/2023</a:t>
+              <a:t>06/08/2023</a:t>
             </a:fld>
             <a:endParaRPr lang="pt-BR"/>
           </a:p>
@@ -3735,7 +3735,7 @@
           <a:p>
             <a:fld id="{7D12BE36-2922-4567-BD67-201EFA21BF6D}" type="datetime1">
               <a:rPr lang="pt-BR" smtClean="0"/>
-              <a:t>26/07/2023</a:t>
+              <a:t>06/08/2023</a:t>
             </a:fld>
             <a:endParaRPr lang="pt-BR"/>
           </a:p>
@@ -3847,7 +3847,7 @@
           <a:p>
             <a:fld id="{E5B462A9-4B1E-4013-BFB1-FC92225AC2F2}" type="datetime1">
               <a:rPr lang="pt-BR" smtClean="0"/>
-              <a:t>26/07/2023</a:t>
+              <a:t>06/08/2023</a:t>
             </a:fld>
             <a:endParaRPr lang="pt-BR"/>
           </a:p>
@@ -3931,7 +3931,7 @@
           <a:p>
             <a:fld id="{D0E6EC7A-67E7-4978-9BAE-C8F82A40B13B}" type="datetime1">
               <a:rPr lang="pt-BR" smtClean="0"/>
-              <a:t>26/07/2023</a:t>
+              <a:t>06/08/2023</a:t>
             </a:fld>
             <a:endParaRPr lang="pt-BR"/>
           </a:p>
@@ -4213,7 +4213,7 @@
           <a:p>
             <a:fld id="{6E085A4E-80B8-47DD-9D9B-8E1B205CBB30}" type="datetime1">
               <a:rPr lang="pt-BR" smtClean="0"/>
-              <a:t>26/07/2023</a:t>
+              <a:t>06/08/2023</a:t>
             </a:fld>
             <a:endParaRPr lang="pt-BR"/>
           </a:p>
@@ -4472,7 +4472,7 @@
           <a:p>
             <a:fld id="{F4E9A02C-D9AD-4B8C-9B93-B0980E8E86EB}" type="datetime1">
               <a:rPr lang="pt-BR" smtClean="0"/>
-              <a:t>26/07/2023</a:t>
+              <a:t>06/08/2023</a:t>
             </a:fld>
             <a:endParaRPr lang="pt-BR"/>
           </a:p>
@@ -4684,7 +4684,7 @@
           <a:p>
             <a:fld id="{202762D0-3A59-4B14-83BA-8E0FC8A60AB1}" type="datetime1">
               <a:rPr lang="pt-BR" smtClean="0"/>
-              <a:t>26/07/2023</a:t>
+              <a:t>06/08/2023</a:t>
             </a:fld>
             <a:endParaRPr lang="pt-BR"/>
           </a:p>
@@ -11325,7 +11325,7 @@
           <p:nvPr>
             <p:extLst>
               <p:ext uri="{D42A27DB-BD31-4B8C-83A1-F6EECF244321}">
-                <p14:modId xmlns:p14="http://schemas.microsoft.com/office/powerpoint/2010/main" val="3349154353"/>
+                <p14:modId xmlns:p14="http://schemas.microsoft.com/office/powerpoint/2010/main" val="3072446903"/>
               </p:ext>
             </p:extLst>
           </p:nvPr>
@@ -11920,14 +11920,14 @@
                         <a:defRPr/>
                       </a:pPr>
                       <a:r>
-                        <a:rPr lang="pt-BR" sz="1200">
+                        <a:rPr lang="pt-BR" sz="1200" dirty="0">
                           <a:solidFill>
                             <a:srgbClr val="FF0000"/>
                           </a:solidFill>
                         </a:rPr>
                         <a:t>Entrega CP1</a:t>
                       </a:r>
-                      <a:endParaRPr lang="pt-BR" sz="1200"/>
+                      <a:endParaRPr lang="pt-BR" sz="1200" dirty="0"/>
                     </a:p>
                     <a:p>
                       <a:pPr marL="0" marR="0" lvl="0" indent="0" algn="l" defTabSz="914400" rtl="0" eaLnBrk="1" fontAlgn="auto" latinLnBrk="0" hangingPunct="1">
@@ -12085,12 +12085,36 @@
                         <a:defRPr/>
                       </a:pPr>
                       <a:r>
+                        <a:rPr lang="pt-BR" sz="1200">
+                          <a:solidFill>
+                            <a:schemeClr val="tx1"/>
+                          </a:solidFill>
+                        </a:rPr>
+                        <a:t>Aula </a:t>
+                      </a:r>
+                      <a:r>
+                        <a:rPr lang="pt-BR" sz="1200" u="sng">
+                          <a:solidFill>
+                            <a:schemeClr val="tx1"/>
+                          </a:solidFill>
+                        </a:rPr>
+                        <a:t>09</a:t>
+                      </a:r>
+                      <a:r>
+                        <a:rPr lang="pt-BR" sz="1200">
+                          <a:solidFill>
+                            <a:schemeClr val="tx1"/>
+                          </a:solidFill>
+                        </a:rPr>
+                        <a:t> </a:t>
+                      </a:r>
+                      <a:r>
                         <a:rPr lang="pt-BR" sz="1200" dirty="0">
                           <a:solidFill>
                             <a:schemeClr val="tx1"/>
                           </a:solidFill>
                         </a:rPr>
-                        <a:t>Aula 9 – Protocolos HTTP, NTP e MQTT</a:t>
+                        <a:t>– Protocolos HTTP, NTP e MQTT</a:t>
                       </a:r>
                     </a:p>
                   </a:txBody>

</xml_diff>